<commit_message>
Agregando ultimas correciones a examen a casa
</commit_message>
<xml_diff>
--- a/Mod_Lineales_Examen_a_casa_v2.pptx
+++ b/Mod_Lineales_Examen_a_casa_v2.pptx
@@ -227,7 +227,7 @@
           <a:p>
             <a:fld id="{3403F07F-0782-4A5D-9DE6-4B439A9337B6}" type="datetimeFigureOut">
               <a:rPr lang="es-MX" smtClean="0"/>
-              <a:t>28/11/2023</a:t>
+              <a:t>05/12/2023</a:t>
             </a:fld>
             <a:endParaRPr lang="es-MX"/>
           </a:p>
@@ -2252,7 +2252,7 @@
           <a:p>
             <a:fld id="{EA0C0817-A112-4847-8014-A94B7D2A4EA3}" type="datetime1">
               <a:rPr lang="en-US" smtClean="0"/>
-              <a:t>11/28/2023</a:t>
+              <a:t>12/5/2023</a:t>
             </a:fld>
             <a:endParaRPr lang="en-US" dirty="0"/>
           </a:p>
@@ -2458,7 +2458,7 @@
           <a:p>
             <a:fld id="{03636942-C211-4B28-8DBD-C953E00AF71B}" type="datetime1">
               <a:rPr lang="en-US" smtClean="0"/>
-              <a:t>11/28/2023</a:t>
+              <a:t>12/5/2023</a:t>
             </a:fld>
             <a:endParaRPr lang="en-US"/>
           </a:p>
@@ -2801,7 +2801,7 @@
           <a:p>
             <a:fld id="{7E8D12A6-918A-48BD-8CB9-CA713993B0EA}" type="datetime1">
               <a:rPr lang="en-US" smtClean="0"/>
-              <a:t>11/28/2023</a:t>
+              <a:t>12/5/2023</a:t>
             </a:fld>
             <a:endParaRPr lang="en-US"/>
           </a:p>
@@ -3163,7 +3163,7 @@
             <a:fld id="{E778CE86-875F-4587-BCF6-FA054AFC0D53}" type="datetime1">
               <a:rPr lang="en-US" smtClean="0"/>
               <a:pPr/>
-              <a:t>11/28/2023</a:t>
+              <a:t>12/5/2023</a:t>
             </a:fld>
             <a:endParaRPr lang="en-US" dirty="0"/>
           </a:p>
@@ -3359,7 +3359,7 @@
           <a:p>
             <a:fld id="{03636942-C211-4B28-8DBD-C953E00AF71B}" type="datetime1">
               <a:rPr lang="en-US" smtClean="0"/>
-              <a:t>11/28/2023</a:t>
+              <a:t>12/5/2023</a:t>
             </a:fld>
             <a:endParaRPr lang="en-US"/>
           </a:p>
@@ -5418,7 +5418,7 @@
           <a:p>
             <a:fld id="{F6FA2B21-3FCD-4721-B95C-427943F61125}" type="datetime1">
               <a:rPr lang="en-US" smtClean="0"/>
-              <a:t>11/28/2023</a:t>
+              <a:t>12/5/2023</a:t>
             </a:fld>
             <a:endParaRPr lang="en-US"/>
           </a:p>
@@ -16838,7 +16838,7 @@
           <p:nvPr>
             <p:extLst>
               <p:ext uri="{D42A27DB-BD31-4B8C-83A1-F6EECF244321}">
-                <p14:modId xmlns:p14="http://schemas.microsoft.com/office/powerpoint/2010/main" val="2437239697"/>
+                <p14:modId xmlns:p14="http://schemas.microsoft.com/office/powerpoint/2010/main" val="3778013292"/>
               </p:ext>
             </p:extLst>
           </p:nvPr>
@@ -17463,7 +17463,7 @@
                           <a:latin typeface="Arial" panose="020B0604020202020204" pitchFamily="34" charset="0"/>
                           <a:cs typeface="Arial" panose="020B0604020202020204" pitchFamily="34" charset="0"/>
                         </a:rPr>
-                        <a:t>36.6%</a:t>
+                        <a:t>45.6%</a:t>
                       </a:r>
                       <a:endParaRPr lang="es-MX" sz="1400" dirty="0">
                         <a:latin typeface="Arial" panose="020B0604020202020204" pitchFamily="34" charset="0"/>
@@ -17752,7 +17752,7 @@
                           <a:latin typeface="Arial" panose="020B0604020202020204" pitchFamily="34" charset="0"/>
                           <a:cs typeface="Arial" panose="020B0604020202020204" pitchFamily="34" charset="0"/>
                         </a:rPr>
-                        <a:t>0.27</a:t>
+                        <a:t>0.37</a:t>
                       </a:r>
                       <a:endParaRPr lang="es-MX" sz="1400" dirty="0">
                         <a:latin typeface="Arial" panose="020B0604020202020204" pitchFamily="34" charset="0"/>
@@ -17915,7 +17915,7 @@
                           <a:latin typeface="Arial" panose="020B0604020202020204" pitchFamily="34" charset="0"/>
                           <a:cs typeface="Arial" panose="020B0604020202020204" pitchFamily="34" charset="0"/>
                         </a:rPr>
-                        <a:t>37.5%</a:t>
+                        <a:t>43.5%</a:t>
                       </a:r>
                       <a:endParaRPr lang="es-MX" sz="1400" dirty="0">
                         <a:latin typeface="Arial" panose="020B0604020202020204" pitchFamily="34" charset="0"/>
@@ -18264,7 +18264,7 @@
                           <a:latin typeface="Arial" panose="020B0604020202020204" pitchFamily="34" charset="0"/>
                           <a:cs typeface="Arial" panose="020B0604020202020204" pitchFamily="34" charset="0"/>
                         </a:rPr>
-                        <a:t>0.33</a:t>
+                        <a:t>0.47</a:t>
                       </a:r>
                       <a:endParaRPr lang="es-MX" sz="1400" dirty="0">
                         <a:latin typeface="Arial" panose="020B0604020202020204" pitchFamily="34" charset="0"/>
@@ -18432,7 +18432,7 @@
                           <a:latin typeface="Arial" panose="020B0604020202020204" pitchFamily="34" charset="0"/>
                           <a:cs typeface="Arial" panose="020B0604020202020204" pitchFamily="34" charset="0"/>
                         </a:rPr>
-                        <a:t>33.3%</a:t>
+                        <a:t>37.3%</a:t>
                       </a:r>
                       <a:endParaRPr lang="es-MX" sz="1400" dirty="0">
                         <a:latin typeface="Arial" panose="020B0604020202020204" pitchFamily="34" charset="0"/>
@@ -18957,7 +18957,7 @@
                           <a:latin typeface="Arial" panose="020B0604020202020204" pitchFamily="34" charset="0"/>
                           <a:cs typeface="Arial" panose="020B0604020202020204" pitchFamily="34" charset="0"/>
                         </a:rPr>
-                        <a:t>0.45</a:t>
+                        <a:t>0.48</a:t>
                       </a:r>
                       <a:endParaRPr lang="es-MX" sz="1400" dirty="0">
                         <a:latin typeface="Arial" panose="020B0604020202020204" pitchFamily="34" charset="0"/>
@@ -19139,7 +19139,7 @@
                           <a:latin typeface="Arial" panose="020B0604020202020204" pitchFamily="34" charset="0"/>
                           <a:cs typeface="Arial" panose="020B0604020202020204" pitchFamily="34" charset="0"/>
                         </a:rPr>
-                        <a:t>30.6%</a:t>
+                        <a:t>37.6%</a:t>
                       </a:r>
                       <a:endParaRPr lang="es-MX" sz="1400" dirty="0">
                         <a:latin typeface="Arial" panose="020B0604020202020204" pitchFamily="34" charset="0"/>
@@ -19470,7 +19470,7 @@
                           <a:latin typeface="Arial" panose="020B0604020202020204" pitchFamily="34" charset="0"/>
                           <a:cs typeface="Arial" panose="020B0604020202020204" pitchFamily="34" charset="0"/>
                         </a:rPr>
-                        <a:t>0.49</a:t>
+                        <a:t>0.47</a:t>
                       </a:r>
                       <a:endParaRPr lang="es-MX" sz="1400" dirty="0">
                         <a:latin typeface="Arial" panose="020B0604020202020204" pitchFamily="34" charset="0"/>
@@ -19646,7 +19646,7 @@
                           <a:latin typeface="Arial" panose="020B0604020202020204" pitchFamily="34" charset="0"/>
                           <a:cs typeface="Arial" panose="020B0604020202020204" pitchFamily="34" charset="0"/>
                         </a:rPr>
-                        <a:t>27.3%</a:t>
+                        <a:t>67.3%</a:t>
                       </a:r>
                       <a:endParaRPr lang="es-MX" sz="1400" dirty="0">
                         <a:latin typeface="Arial" panose="020B0604020202020204" pitchFamily="34" charset="0"/>
@@ -21185,182 +21185,122 @@
               <a:buChar char="ü"/>
             </a:pPr>
             <a:r>
-              <a:rPr lang="es-ES" sz="1800" b="0" i="0" u="none" strike="noStrike" kern="1200" dirty="0">
+              <a:rPr lang="es-ES" dirty="0">
                 <a:solidFill>
                   <a:schemeClr val="dk1"/>
                 </a:solidFill>
-                <a:effectLst/>
-                <a:latin typeface="+mn-lt"/>
-                <a:ea typeface="+mn-ea"/>
-                <a:cs typeface="+mn-cs"/>
               </a:rPr>
               <a:t>Los modelos lineales de MCO permitieron modelar a los datos de </a:t>
             </a:r>
             <a:r>
-              <a:rPr lang="es-ES" sz="1800" b="0" i="0" u="none" strike="noStrike" kern="1200" dirty="0" err="1">
+              <a:rPr lang="es-ES" dirty="0" err="1">
                 <a:solidFill>
                   <a:schemeClr val="dk1"/>
                 </a:solidFill>
-                <a:effectLst/>
-                <a:latin typeface="+mn-lt"/>
-                <a:ea typeface="+mn-ea"/>
-                <a:cs typeface="+mn-cs"/>
               </a:rPr>
               <a:t>wage</a:t>
             </a:r>
             <a:r>
-              <a:rPr lang="es-ES" sz="1800" b="0" i="0" u="none" strike="noStrike" kern="1200" dirty="0">
+              <a:rPr lang="es-ES" dirty="0">
                 <a:solidFill>
                   <a:schemeClr val="dk1"/>
                 </a:solidFill>
-                <a:effectLst/>
-                <a:latin typeface="+mn-lt"/>
-                <a:ea typeface="+mn-ea"/>
-                <a:cs typeface="+mn-cs"/>
               </a:rPr>
               <a:t> como función de variables sociodemográficas con un R</a:t>
             </a:r>
             <a:r>
-              <a:rPr lang="en-US" sz="1800" b="0" i="0" u="none" strike="noStrike" kern="1200" dirty="0">
+              <a:rPr lang="en-US" dirty="0">
                 <a:solidFill>
                   <a:schemeClr val="dk1"/>
                 </a:solidFill>
-                <a:effectLst/>
-                <a:latin typeface="+mn-lt"/>
-                <a:ea typeface="+mn-ea"/>
-                <a:cs typeface="+mn-cs"/>
               </a:rPr>
               <a:t>^2 </a:t>
             </a:r>
             <a:r>
-              <a:rPr lang="en-US" sz="1800" b="0" i="0" u="none" strike="noStrike" kern="1200" dirty="0" err="1">
+              <a:rPr lang="en-US" dirty="0" err="1">
                 <a:solidFill>
                   <a:schemeClr val="dk1"/>
                 </a:solidFill>
-                <a:effectLst/>
-                <a:latin typeface="+mn-lt"/>
-                <a:ea typeface="+mn-ea"/>
-                <a:cs typeface="+mn-cs"/>
               </a:rPr>
               <a:t>ajustado</a:t>
             </a:r>
             <a:r>
-              <a:rPr lang="en-US" sz="1800" b="0" i="0" u="none" strike="noStrike" kern="1200" dirty="0">
+              <a:rPr lang="en-US" dirty="0">
                 <a:solidFill>
                   <a:schemeClr val="dk1"/>
                 </a:solidFill>
-                <a:effectLst/>
-                <a:latin typeface="+mn-lt"/>
-                <a:ea typeface="+mn-ea"/>
-                <a:cs typeface="+mn-cs"/>
               </a:rPr>
               <a:t> de 0.33 y </a:t>
             </a:r>
             <a:r>
-              <a:rPr lang="en-US" sz="1800" b="0" i="0" u="none" strike="noStrike" kern="1200" dirty="0" err="1">
+              <a:rPr lang="en-US" dirty="0" err="1">
                 <a:solidFill>
                   <a:schemeClr val="dk1"/>
                 </a:solidFill>
-                <a:effectLst/>
-                <a:latin typeface="+mn-lt"/>
-                <a:ea typeface="+mn-ea"/>
-                <a:cs typeface="+mn-cs"/>
               </a:rPr>
               <a:t>teniendo</a:t>
             </a:r>
             <a:r>
-              <a:rPr lang="en-US" sz="1800" b="0" i="0" u="none" strike="noStrike" kern="1200" dirty="0">
+              <a:rPr lang="en-US" dirty="0">
                 <a:solidFill>
                   <a:schemeClr val="dk1"/>
                 </a:solidFill>
-                <a:effectLst/>
-                <a:latin typeface="+mn-lt"/>
-                <a:ea typeface="+mn-ea"/>
-                <a:cs typeface="+mn-cs"/>
               </a:rPr>
               <a:t> un MAPE de 33% </a:t>
             </a:r>
             <a:r>
-              <a:rPr lang="en-US" sz="1800" b="0" i="0" u="none" strike="noStrike" kern="1200" dirty="0" err="1">
+              <a:rPr lang="en-US" dirty="0" err="1">
                 <a:solidFill>
                   <a:schemeClr val="dk1"/>
                 </a:solidFill>
-                <a:effectLst/>
-                <a:latin typeface="+mn-lt"/>
-                <a:ea typeface="+mn-ea"/>
-                <a:cs typeface="+mn-cs"/>
               </a:rPr>
               <a:t>en</a:t>
             </a:r>
             <a:r>
-              <a:rPr lang="en-US" sz="1800" b="0" i="0" u="none" strike="noStrike" kern="1200" dirty="0">
+              <a:rPr lang="en-US" dirty="0">
                 <a:solidFill>
                   <a:schemeClr val="dk1"/>
                 </a:solidFill>
-                <a:effectLst/>
-                <a:latin typeface="+mn-lt"/>
-                <a:ea typeface="+mn-ea"/>
-                <a:cs typeface="+mn-cs"/>
               </a:rPr>
               <a:t> </a:t>
             </a:r>
             <a:r>
-              <a:rPr lang="en-US" sz="1800" b="0" i="0" u="none" strike="noStrike" kern="1200" dirty="0" err="1">
+              <a:rPr lang="en-US" dirty="0" err="1">
                 <a:solidFill>
                   <a:schemeClr val="dk1"/>
                 </a:solidFill>
-                <a:effectLst/>
-                <a:latin typeface="+mn-lt"/>
-                <a:ea typeface="+mn-ea"/>
-                <a:cs typeface="+mn-cs"/>
               </a:rPr>
               <a:t>el</a:t>
             </a:r>
             <a:r>
-              <a:rPr lang="en-US" sz="1800" b="0" i="0" u="none" strike="noStrike" kern="1200" dirty="0">
+              <a:rPr lang="en-US" dirty="0">
                 <a:solidFill>
                   <a:schemeClr val="dk1"/>
                 </a:solidFill>
-                <a:effectLst/>
-                <a:latin typeface="+mn-lt"/>
-                <a:ea typeface="+mn-ea"/>
-                <a:cs typeface="+mn-cs"/>
               </a:rPr>
               <a:t> </a:t>
             </a:r>
             <a:r>
-              <a:rPr lang="en-US" sz="1800" b="0" i="0" u="none" strike="noStrike" kern="1200" dirty="0" err="1">
+              <a:rPr lang="en-US" dirty="0" err="1">
                 <a:solidFill>
                   <a:schemeClr val="dk1"/>
                 </a:solidFill>
-                <a:effectLst/>
-                <a:latin typeface="+mn-lt"/>
-                <a:ea typeface="+mn-ea"/>
-                <a:cs typeface="+mn-cs"/>
               </a:rPr>
               <a:t>pronóstico</a:t>
             </a:r>
             <a:r>
-              <a:rPr lang="en-US" sz="1800" b="0" i="0" u="none" strike="noStrike" kern="1200" dirty="0">
+              <a:rPr lang="en-US" dirty="0">
                 <a:solidFill>
                   <a:schemeClr val="dk1"/>
                 </a:solidFill>
-                <a:effectLst/>
-                <a:latin typeface="+mn-lt"/>
-                <a:ea typeface="+mn-ea"/>
-                <a:cs typeface="+mn-cs"/>
               </a:rPr>
               <a:t> de un set de </a:t>
             </a:r>
             <a:r>
-              <a:rPr lang="en-US" sz="1800" b="0" i="1" u="none" strike="noStrike" kern="1200" dirty="0">
+              <a:rPr lang="en-US" i="1" dirty="0">
                 <a:solidFill>
                   <a:schemeClr val="dk1"/>
                 </a:solidFill>
-                <a:effectLst/>
-                <a:latin typeface="+mn-lt"/>
-                <a:ea typeface="+mn-ea"/>
-                <a:cs typeface="+mn-cs"/>
               </a:rPr>
               <a:t>test</a:t>
             </a:r>

</xml_diff>